<commit_message>
Add the second presentation of the competitive programming course.
</commit_message>
<xml_diff>
--- a/git/Git - Semana 2 - Git basico-2.pptx
+++ b/git/Git - Semana 2 - Git basico-2.pptx
@@ -224,7 +224,7 @@
           <a:p>
             <a:fld id="{D29A8A24-6A68-8D47-ADF6-CAB6E4EE01A6}" type="datetimeFigureOut">
               <a:rPr lang="en-US" smtClean="0"/>
-              <a:t>10/24/18</a:t>
+              <a:t>3/20/19</a:t>
             </a:fld>
             <a:endParaRPr lang="en-US"/>
           </a:p>
@@ -724,7 +724,7 @@
           <a:p>
             <a:fld id="{4CB1D59E-A200-4429-B13F-42C65375E1C9}" type="datetimeFigureOut">
               <a:rPr lang="es-ES" smtClean="0"/>
-              <a:t>24/10/18</a:t>
+              <a:t>20/3/19</a:t>
             </a:fld>
             <a:endParaRPr lang="es-ES"/>
           </a:p>
@@ -894,7 +894,7 @@
           <a:p>
             <a:fld id="{4CB1D59E-A200-4429-B13F-42C65375E1C9}" type="datetimeFigureOut">
               <a:rPr lang="es-ES" smtClean="0"/>
-              <a:t>24/10/18</a:t>
+              <a:t>20/3/19</a:t>
             </a:fld>
             <a:endParaRPr lang="es-ES"/>
           </a:p>
@@ -1117,7 +1117,7 @@
           <a:p>
             <a:fld id="{4CB1D59E-A200-4429-B13F-42C65375E1C9}" type="datetimeFigureOut">
               <a:rPr lang="es-ES" smtClean="0"/>
-              <a:t>24/10/18</a:t>
+              <a:t>20/3/19</a:t>
             </a:fld>
             <a:endParaRPr lang="es-ES"/>
           </a:p>
@@ -1297,7 +1297,7 @@
           <a:p>
             <a:fld id="{4CB1D59E-A200-4429-B13F-42C65375E1C9}" type="datetimeFigureOut">
               <a:rPr lang="es-ES" smtClean="0"/>
-              <a:t>24/10/18</a:t>
+              <a:t>20/3/19</a:t>
             </a:fld>
             <a:endParaRPr lang="es-ES"/>
           </a:p>
@@ -1641,7 +1641,7 @@
           <a:p>
             <a:fld id="{4CB1D59E-A200-4429-B13F-42C65375E1C9}" type="datetimeFigureOut">
               <a:rPr lang="es-ES" smtClean="0"/>
-              <a:t>24/10/18</a:t>
+              <a:t>20/3/19</a:t>
             </a:fld>
             <a:endParaRPr lang="es-ES"/>
           </a:p>
@@ -1945,7 +1945,7 @@
           <a:p>
             <a:fld id="{4CB1D59E-A200-4429-B13F-42C65375E1C9}" type="datetimeFigureOut">
               <a:rPr lang="es-ES" smtClean="0"/>
-              <a:t>24/10/18</a:t>
+              <a:t>20/3/19</a:t>
             </a:fld>
             <a:endParaRPr lang="es-ES"/>
           </a:p>
@@ -2367,7 +2367,7 @@
           <a:p>
             <a:fld id="{4CB1D59E-A200-4429-B13F-42C65375E1C9}" type="datetimeFigureOut">
               <a:rPr lang="es-ES" smtClean="0"/>
-              <a:t>24/10/18</a:t>
+              <a:t>20/3/19</a:t>
             </a:fld>
             <a:endParaRPr lang="es-ES"/>
           </a:p>
@@ -2485,7 +2485,7 @@
           <a:p>
             <a:fld id="{4CB1D59E-A200-4429-B13F-42C65375E1C9}" type="datetimeFigureOut">
               <a:rPr lang="es-ES" smtClean="0"/>
-              <a:t>24/10/18</a:t>
+              <a:t>20/3/19</a:t>
             </a:fld>
             <a:endParaRPr lang="es-ES"/>
           </a:p>
@@ -2580,7 +2580,7 @@
           <a:p>
             <a:fld id="{4CB1D59E-A200-4429-B13F-42C65375E1C9}" type="datetimeFigureOut">
               <a:rPr lang="es-ES" smtClean="0"/>
-              <a:t>24/10/18</a:t>
+              <a:t>20/3/19</a:t>
             </a:fld>
             <a:endParaRPr lang="es-ES"/>
           </a:p>
@@ -2853,7 +2853,7 @@
           <a:p>
             <a:fld id="{4CB1D59E-A200-4429-B13F-42C65375E1C9}" type="datetimeFigureOut">
               <a:rPr lang="es-ES" smtClean="0"/>
-              <a:t>24/10/18</a:t>
+              <a:t>20/3/19</a:t>
             </a:fld>
             <a:endParaRPr lang="es-ES"/>
           </a:p>
@@ -3118,7 +3118,7 @@
           <a:p>
             <a:fld id="{4CB1D59E-A200-4429-B13F-42C65375E1C9}" type="datetimeFigureOut">
               <a:rPr lang="es-ES" smtClean="0"/>
-              <a:t>24/10/18</a:t>
+              <a:t>20/3/19</a:t>
             </a:fld>
             <a:endParaRPr lang="es-ES"/>
           </a:p>
@@ -3367,7 +3367,7 @@
           <a:p>
             <a:fld id="{4CB1D59E-A200-4429-B13F-42C65375E1C9}" type="datetimeFigureOut">
               <a:rPr lang="es-ES" smtClean="0"/>
-              <a:t>24/10/18</a:t>
+              <a:t>20/3/19</a:t>
             </a:fld>
             <a:endParaRPr lang="es-ES"/>
           </a:p>
@@ -6807,7 +6807,7 @@
             </a:r>
             <a:r>
               <a:rPr lang="en-US" sz="6000" b="1" dirty="0"/>
-              <a:t>4744861</a:t>
+              <a:t>606470</a:t>
             </a:r>
             <a:r>
               <a:rPr lang="en-US" sz="7200" dirty="0">

</xml_diff>